<commit_message>
updating images and trying to remove icons
</commit_message>
<xml_diff>
--- a/pic-edit.pptx
+++ b/pic-edit.pptx
@@ -8,8 +8,8 @@
     <p:sldId id="256" r:id="rId2"/>
     <p:sldId id="257" r:id="rId3"/>
     <p:sldId id="258" r:id="rId4"/>
-    <p:sldId id="259" r:id="rId5"/>
-    <p:sldId id="260" r:id="rId6"/>
+    <p:sldId id="260" r:id="rId5"/>
+    <p:sldId id="259" r:id="rId6"/>
   </p:sldIdLst>
   <p:sldSz cx="9144000" cy="6858000" type="screen4x3"/>
   <p:notesSz cx="6858000" cy="9144000"/>
@@ -3219,7 +3219,7 @@
         </p:blipFill>
         <p:spPr>
           <a:xfrm>
-            <a:off x="8499177" y="1434194"/>
+            <a:off x="736600" y="983344"/>
             <a:ext cx="5295900" cy="3975100"/>
           </a:xfrm>
           <a:prstGeom prst="rect">
@@ -3229,34 +3229,34 @@
       </p:pic>
       <p:grpSp>
         <p:nvGrpSpPr>
-          <p:cNvPr id="7" name="Group 6"/>
+          <p:cNvPr id="9" name="Group 8"/>
           <p:cNvGrpSpPr/>
           <p:nvPr/>
         </p:nvGrpSpPr>
         <p:grpSpPr>
           <a:xfrm>
-            <a:off x="736600" y="983344"/>
-            <a:ext cx="6946900" cy="5214340"/>
-            <a:chOff x="736600" y="983344"/>
-            <a:chExt cx="6946900" cy="5214340"/>
+            <a:off x="3216795" y="1313544"/>
+            <a:ext cx="5304905" cy="3981860"/>
+            <a:chOff x="3216795" y="1313544"/>
+            <a:chExt cx="5304905" cy="3981860"/>
           </a:xfrm>
         </p:grpSpPr>
         <p:sp>
           <p:nvSpPr>
-            <p:cNvPr id="6" name="Rectangle 5"/>
+            <p:cNvPr id="8" name="Rectangle 7"/>
             <p:cNvSpPr/>
             <p:nvPr/>
           </p:nvSpPr>
           <p:spPr>
             <a:xfrm>
-              <a:off x="736600" y="983344"/>
-              <a:ext cx="6946900" cy="5214340"/>
+              <a:off x="3216795" y="1313544"/>
+              <a:ext cx="5304905" cy="3981860"/>
             </a:xfrm>
             <a:prstGeom prst="rect">
               <a:avLst/>
             </a:prstGeom>
             <a:solidFill>
-              <a:srgbClr val="27376F"/>
+              <a:srgbClr val="66162C"/>
             </a:solidFill>
             <a:ln>
               <a:noFill/>
@@ -3320,8 +3320,8 @@
           </p:blipFill>
           <p:spPr>
             <a:xfrm>
-              <a:off x="848149" y="1959178"/>
-              <a:ext cx="6743700" cy="3528680"/>
+              <a:off x="3280295" y="2057461"/>
+              <a:ext cx="5140993" cy="2690055"/>
             </a:xfrm>
             <a:prstGeom prst="rect">
               <a:avLst/>
@@ -3359,30 +3359,54 @@
           <a:chExt cx="0" cy="0"/>
         </a:xfrm>
       </p:grpSpPr>
+      <p:pic>
+        <p:nvPicPr>
+          <p:cNvPr id="7" name="Picture 6"/>
+          <p:cNvPicPr>
+            <a:picLocks noChangeAspect="1"/>
+          </p:cNvPicPr>
+          <p:nvPr/>
+        </p:nvPicPr>
+        <p:blipFill>
+          <a:blip r:embed="rId2"/>
+          <a:stretch>
+            <a:fillRect/>
+          </a:stretch>
+        </p:blipFill>
+        <p:spPr>
+          <a:xfrm>
+            <a:off x="7086898" y="2614613"/>
+            <a:ext cx="5295900" cy="3975100"/>
+          </a:xfrm>
+          <a:prstGeom prst="rect">
+            <a:avLst/>
+          </a:prstGeom>
+        </p:spPr>
+      </p:pic>
       <p:grpSp>
         <p:nvGrpSpPr>
-          <p:cNvPr id="5" name="Group 4"/>
+          <p:cNvPr id="9" name="Group 8"/>
           <p:cNvGrpSpPr/>
           <p:nvPr/>
         </p:nvGrpSpPr>
         <p:grpSpPr>
           <a:xfrm>
-            <a:off x="266700" y="462644"/>
-            <a:ext cx="6985000" cy="5214340"/>
-            <a:chOff x="266700" y="462644"/>
-            <a:chExt cx="6985000" cy="5214340"/>
+            <a:off x="100188" y="983343"/>
+            <a:ext cx="5330505" cy="3975101"/>
+            <a:chOff x="100188" y="983343"/>
+            <a:chExt cx="5330505" cy="3975101"/>
           </a:xfrm>
         </p:grpSpPr>
         <p:sp>
           <p:nvSpPr>
-            <p:cNvPr id="3" name="Rectangle 2"/>
+            <p:cNvPr id="8" name="Rectangle 7"/>
             <p:cNvSpPr/>
             <p:nvPr/>
           </p:nvSpPr>
           <p:spPr>
             <a:xfrm>
-              <a:off x="304800" y="462644"/>
-              <a:ext cx="6946900" cy="5214340"/>
+              <a:off x="100188" y="983343"/>
+              <a:ext cx="5295900" cy="3975101"/>
             </a:xfrm>
             <a:prstGeom prst="rect">
               <a:avLst/>
@@ -3430,11 +3454,11 @@
             <p:nvPr/>
           </p:nvPicPr>
           <p:blipFill>
-            <a:blip r:embed="rId2">
+            <a:blip r:embed="rId3">
               <a:extLst>
                 <a:ext uri="{BEBA8EAE-BF5A-486C-A8C5-ECC9F3942E4B}">
                   <a14:imgProps xmlns:a14="http://schemas.microsoft.com/office/drawing/2010/main">
-                    <a14:imgLayer r:embed="rId3">
+                    <a14:imgLayer r:embed="rId4">
                       <a14:imgEffect>
                         <a14:backgroundRemoval t="4151" b="97358" l="2189" r="99158">
                           <a14:backgroundMark x1="11953" y1="41887" x2="11953" y2="41887"/>
@@ -3501,8 +3525,8 @@
           </p:blipFill>
           <p:spPr>
             <a:xfrm>
-              <a:off x="266700" y="1485901"/>
-              <a:ext cx="6974457" cy="3111500"/>
+              <a:off x="104744" y="1764740"/>
+              <a:ext cx="5325949" cy="2376055"/>
             </a:xfrm>
             <a:prstGeom prst="rect">
               <a:avLst/>
@@ -3540,10 +3564,138 @@
           <a:chExt cx="0" cy="0"/>
         </a:xfrm>
       </p:grpSpPr>
+      <p:pic>
+        <p:nvPicPr>
+          <p:cNvPr id="2" name="Picture 1"/>
+          <p:cNvPicPr>
+            <a:picLocks noChangeAspect="1"/>
+          </p:cNvPicPr>
+          <p:nvPr/>
+        </p:nvPicPr>
+        <p:blipFill>
+          <a:blip r:embed="rId2"/>
+          <a:stretch>
+            <a:fillRect/>
+          </a:stretch>
+        </p:blipFill>
+        <p:spPr>
+          <a:xfrm>
+            <a:off x="3517900" y="2882900"/>
+            <a:ext cx="5295900" cy="3975100"/>
+          </a:xfrm>
+          <a:prstGeom prst="rect">
+            <a:avLst/>
+          </a:prstGeom>
+        </p:spPr>
+      </p:pic>
+      <p:grpSp>
+        <p:nvGrpSpPr>
+          <p:cNvPr id="6" name="Group 5"/>
+          <p:cNvGrpSpPr/>
+          <p:nvPr/>
+        </p:nvGrpSpPr>
+        <p:grpSpPr>
+          <a:xfrm>
+            <a:off x="765695" y="983343"/>
+            <a:ext cx="5304905" cy="3981861"/>
+            <a:chOff x="765695" y="983343"/>
+            <a:chExt cx="5304905" cy="3981861"/>
+          </a:xfrm>
+        </p:grpSpPr>
+        <p:sp>
+          <p:nvSpPr>
+            <p:cNvPr id="5" name="Rectangle 4"/>
+            <p:cNvSpPr/>
+            <p:nvPr/>
+          </p:nvSpPr>
+          <p:spPr>
+            <a:xfrm>
+              <a:off x="765695" y="983344"/>
+              <a:ext cx="5304905" cy="3981860"/>
+            </a:xfrm>
+            <a:prstGeom prst="rect">
+              <a:avLst/>
+            </a:prstGeom>
+            <a:solidFill>
+              <a:srgbClr val="66162C"/>
+            </a:solidFill>
+            <a:ln>
+              <a:noFill/>
+            </a:ln>
+          </p:spPr>
+          <p:style>
+            <a:lnRef idx="1">
+              <a:schemeClr val="accent1"/>
+            </a:lnRef>
+            <a:fillRef idx="3">
+              <a:schemeClr val="accent1"/>
+            </a:fillRef>
+            <a:effectRef idx="2">
+              <a:schemeClr val="accent1"/>
+            </a:effectRef>
+            <a:fontRef idx="minor">
+              <a:schemeClr val="lt1"/>
+            </a:fontRef>
+          </p:style>
+          <p:txBody>
+            <a:bodyPr rtlCol="0" anchor="ctr"/>
+            <a:lstStyle/>
+            <a:p>
+              <a:pPr algn="ctr"/>
+              <a:endParaRPr lang="en-US">
+                <a:solidFill>
+                  <a:srgbClr val="27376F"/>
+                </a:solidFill>
+              </a:endParaRPr>
+            </a:p>
+          </p:txBody>
+        </p:sp>
+        <p:pic>
+          <p:nvPicPr>
+            <p:cNvPr id="3" name="Picture 2" descr="20161006_113202 (Small).jpg"/>
+            <p:cNvPicPr>
+              <a:picLocks noChangeAspect="1"/>
+            </p:cNvPicPr>
+            <p:nvPr/>
+          </p:nvPicPr>
+          <p:blipFill rotWithShape="1">
+            <a:blip r:embed="rId3">
+              <a:extLst>
+                <a:ext uri="{BEBA8EAE-BF5A-486C-A8C5-ECC9F3942E4B}">
+                  <a14:imgProps xmlns:a14="http://schemas.microsoft.com/office/drawing/2010/main">
+                    <a14:imgLayer r:embed="rId4">
+                      <a14:imgEffect>
+                        <a14:backgroundRemoval t="12500" b="94792" l="14537" r="75967">
+                          <a14:foregroundMark x1="69402" y1="56458" x2="69402" y2="56458"/>
+                          <a14:foregroundMark x1="69519" y1="70625" x2="69519" y2="70625"/>
+                        </a14:backgroundRemoval>
+                      </a14:imgEffect>
+                    </a14:imgLayer>
+                  </a14:imgProps>
+                </a:ext>
+                <a:ext uri="{28A0092B-C50C-407E-A947-70E740481C1C}">
+                  <a14:useLocalDpi xmlns:a14="http://schemas.microsoft.com/office/drawing/2010/main" val="0"/>
+                </a:ext>
+              </a:extLst>
+            </a:blip>
+            <a:srcRect l="15529" t="14091" r="26555" b="8657"/>
+            <a:stretch/>
+          </p:blipFill>
+          <p:spPr>
+            <a:xfrm>
+              <a:off x="765695" y="983343"/>
+              <a:ext cx="5295900" cy="3975100"/>
+            </a:xfrm>
+            <a:prstGeom prst="rect">
+              <a:avLst/>
+            </a:prstGeom>
+          </p:spPr>
+        </p:pic>
+      </p:grpSp>
     </p:spTree>
     <p:extLst>
       <p:ext uri="{BB962C8B-B14F-4D97-AF65-F5344CB8AC3E}">
-        <p14:creationId xmlns:p14="http://schemas.microsoft.com/office/powerpoint/2010/main" val="3879680336"/>
+        <p14:creationId xmlns:p14="http://schemas.microsoft.com/office/powerpoint/2010/main" val="3765483873"/>
       </p:ext>
     </p:extLst>
   </p:cSld>
@@ -3570,10 +3722,39 @@
           <a:chExt cx="0" cy="0"/>
         </a:xfrm>
       </p:grpSpPr>
+      <p:pic>
+        <p:nvPicPr>
+          <p:cNvPr id="3" name="Picture 2" descr="header.jpg"/>
+          <p:cNvPicPr>
+            <a:picLocks noChangeAspect="1"/>
+          </p:cNvPicPr>
+          <p:nvPr/>
+        </p:nvPicPr>
+        <p:blipFill rotWithShape="1">
+          <a:blip r:embed="rId2">
+            <a:extLst>
+              <a:ext uri="{28A0092B-C50C-407E-A947-70E740481C1C}">
+                <a14:useLocalDpi xmlns:a14="http://schemas.microsoft.com/office/drawing/2010/main" val="0"/>
+              </a:ext>
+            </a:extLst>
+          </a:blip>
+          <a:srcRect t="25000" r="5432"/>
+          <a:stretch/>
+        </p:blipFill>
+        <p:spPr>
+          <a:xfrm>
+            <a:off x="863601" y="1612900"/>
+            <a:ext cx="7683500" cy="3429000"/>
+          </a:xfrm>
+          <a:prstGeom prst="rect">
+            <a:avLst/>
+          </a:prstGeom>
+        </p:spPr>
+      </p:pic>
     </p:spTree>
     <p:extLst>
       <p:ext uri="{BB962C8B-B14F-4D97-AF65-F5344CB8AC3E}">
-        <p14:creationId xmlns:p14="http://schemas.microsoft.com/office/powerpoint/2010/main" val="3765483873"/>
+        <p14:creationId xmlns:p14="http://schemas.microsoft.com/office/powerpoint/2010/main" val="3879680336"/>
       </p:ext>
     </p:extLst>
   </p:cSld>

</xml_diff>